<commit_message>
Add PPT and Demo
</commit_message>
<xml_diff>
--- a/ToolsForAPI.pptx
+++ b/ToolsForAPI.pptx
@@ -5,7 +5,7 @@
     <p:sldMasterId id="2147483733" r:id="rId1"/>
   </p:sldMasterIdLst>
   <p:notesMasterIdLst>
-    <p:notesMasterId r:id="rId32"/>
+    <p:notesMasterId r:id="rId37"/>
   </p:notesMasterIdLst>
   <p:sldIdLst>
     <p:sldId id="257" r:id="rId2"/>
@@ -38,6 +38,11 @@
     <p:sldId id="346" r:id="rId29"/>
     <p:sldId id="347" r:id="rId30"/>
     <p:sldId id="348" r:id="rId31"/>
+    <p:sldId id="349" r:id="rId32"/>
+    <p:sldId id="353" r:id="rId33"/>
+    <p:sldId id="352" r:id="rId34"/>
+    <p:sldId id="350" r:id="rId35"/>
+    <p:sldId id="351" r:id="rId36"/>
   </p:sldIdLst>
   <p:sldSz cx="12192000" cy="6858000"/>
   <p:notesSz cx="6858000" cy="9144000"/>
@@ -177,6 +182,15 @@
             <p14:sldId id="348"/>
           </p14:sldIdLst>
         </p14:section>
+        <p14:section name="Cache en redis" id="{DA161A88-1A16-45AA-B3A0-21EEC3D27A43}">
+          <p14:sldIdLst>
+            <p14:sldId id="349"/>
+            <p14:sldId id="353"/>
+            <p14:sldId id="352"/>
+            <p14:sldId id="350"/>
+            <p14:sldId id="351"/>
+          </p14:sldIdLst>
+        </p14:section>
       </p14:sectionLst>
     </p:ext>
     <p:ext uri="{EFAFB233-063F-42B5-8137-9DF3F51BA10A}">
@@ -268,7 +282,7 @@
           <a:p>
             <a:fld id="{CAF0A8B5-738B-4F91-AEE8-4CECB76619C0}" type="datetimeFigureOut">
               <a:rPr lang="es-CO" smtClean="0"/>
-              <a:t>24/07/2018</a:t>
+              <a:t>27/07/2018</a:t>
             </a:fld>
             <a:endParaRPr lang="es-CO"/>
           </a:p>
@@ -3593,6 +3607,827 @@
 </p:notes>
 </file>
 
+<file path=ppt/notesSlides/notesSlide31.xml><?xml version="1.0" encoding="utf-8"?>
+<p:notes xmlns:a="http://schemas.openxmlformats.org/drawingml/2006/main" xmlns:r="http://schemas.openxmlformats.org/officeDocument/2006/relationships" xmlns:p="http://schemas.openxmlformats.org/presentationml/2006/main">
+  <p:cSld>
+    <p:spTree>
+      <p:nvGrpSpPr>
+        <p:cNvPr id="1" name=""/>
+        <p:cNvGrpSpPr/>
+        <p:nvPr/>
+      </p:nvGrpSpPr>
+      <p:grpSpPr>
+        <a:xfrm>
+          <a:off x="0" y="0"/>
+          <a:ext cx="0" cy="0"/>
+          <a:chOff x="0" y="0"/>
+          <a:chExt cx="0" cy="0"/>
+        </a:xfrm>
+      </p:grpSpPr>
+      <p:sp>
+        <p:nvSpPr>
+          <p:cNvPr id="2" name="Marcador de imagen de diapositiva 1"/>
+          <p:cNvSpPr>
+            <a:spLocks noGrp="1" noRot="1" noChangeAspect="1"/>
+          </p:cNvSpPr>
+          <p:nvPr>
+            <p:ph type="sldImg"/>
+          </p:nvPr>
+        </p:nvSpPr>
+        <p:spPr/>
+      </p:sp>
+      <p:sp>
+        <p:nvSpPr>
+          <p:cNvPr id="3" name="Marcador de notas 2"/>
+          <p:cNvSpPr>
+            <a:spLocks noGrp="1"/>
+          </p:cNvSpPr>
+          <p:nvPr>
+            <p:ph type="body" idx="1"/>
+          </p:nvPr>
+        </p:nvSpPr>
+        <p:spPr/>
+        <p:txBody>
+          <a:bodyPr/>
+          <a:lstStyle/>
+          <a:p>
+            <a:pPr marL="0" marR="0" lvl="0" indent="0" algn="l" defTabSz="914400" rtl="0" eaLnBrk="1" fontAlgn="auto" latinLnBrk="0" hangingPunct="1">
+              <a:lnSpc>
+                <a:spcPct val="100000"/>
+              </a:lnSpc>
+              <a:spcBef>
+                <a:spcPts val="0"/>
+              </a:spcBef>
+              <a:spcAft>
+                <a:spcPts val="0"/>
+              </a:spcAft>
+              <a:buClrTx/>
+              <a:buSzTx/>
+              <a:buFontTx/>
+              <a:buNone/>
+              <a:tabLst/>
+              <a:defRPr/>
+            </a:pPr>
+            <a:endParaRPr lang="es-CO" dirty="0"/>
+          </a:p>
+        </p:txBody>
+      </p:sp>
+      <p:sp>
+        <p:nvSpPr>
+          <p:cNvPr id="4" name="Marcador de número de diapositiva 3"/>
+          <p:cNvSpPr>
+            <a:spLocks noGrp="1"/>
+          </p:cNvSpPr>
+          <p:nvPr>
+            <p:ph type="sldNum" sz="quarter" idx="10"/>
+          </p:nvPr>
+        </p:nvSpPr>
+        <p:spPr/>
+        <p:txBody>
+          <a:bodyPr/>
+          <a:lstStyle/>
+          <a:p>
+            <a:fld id="{F82B9EC9-5510-408D-8820-096EB829DDB0}" type="slidenum">
+              <a:rPr lang="es-CO" smtClean="0"/>
+              <a:t>31</a:t>
+            </a:fld>
+            <a:endParaRPr lang="es-CO"/>
+          </a:p>
+        </p:txBody>
+      </p:sp>
+    </p:spTree>
+    <p:extLst>
+      <p:ext uri="{BB962C8B-B14F-4D97-AF65-F5344CB8AC3E}">
+        <p14:creationId xmlns:p14="http://schemas.microsoft.com/office/powerpoint/2010/main" val="2061543852"/>
+      </p:ext>
+    </p:extLst>
+  </p:cSld>
+  <p:clrMapOvr>
+    <a:masterClrMapping/>
+  </p:clrMapOvr>
+</p:notes>
+</file>
+
+<file path=ppt/notesSlides/notesSlide32.xml><?xml version="1.0" encoding="utf-8"?>
+<p:notes xmlns:a="http://schemas.openxmlformats.org/drawingml/2006/main" xmlns:r="http://schemas.openxmlformats.org/officeDocument/2006/relationships" xmlns:p="http://schemas.openxmlformats.org/presentationml/2006/main">
+  <p:cSld>
+    <p:spTree>
+      <p:nvGrpSpPr>
+        <p:cNvPr id="1" name=""/>
+        <p:cNvGrpSpPr/>
+        <p:nvPr/>
+      </p:nvGrpSpPr>
+      <p:grpSpPr>
+        <a:xfrm>
+          <a:off x="0" y="0"/>
+          <a:ext cx="0" cy="0"/>
+          <a:chOff x="0" y="0"/>
+          <a:chExt cx="0" cy="0"/>
+        </a:xfrm>
+      </p:grpSpPr>
+      <p:sp>
+        <p:nvSpPr>
+          <p:cNvPr id="2" name="Marcador de imagen de diapositiva 1"/>
+          <p:cNvSpPr>
+            <a:spLocks noGrp="1" noRot="1" noChangeAspect="1"/>
+          </p:cNvSpPr>
+          <p:nvPr>
+            <p:ph type="sldImg"/>
+          </p:nvPr>
+        </p:nvSpPr>
+        <p:spPr/>
+      </p:sp>
+      <p:sp>
+        <p:nvSpPr>
+          <p:cNvPr id="3" name="Marcador de notas 2"/>
+          <p:cNvSpPr>
+            <a:spLocks noGrp="1"/>
+          </p:cNvSpPr>
+          <p:nvPr>
+            <p:ph type="body" idx="1"/>
+          </p:nvPr>
+        </p:nvSpPr>
+        <p:spPr/>
+        <p:txBody>
+          <a:bodyPr/>
+          <a:lstStyle/>
+          <a:p>
+            <a:pPr marL="0" marR="0" lvl="0" indent="0" algn="l" defTabSz="914400" rtl="0" eaLnBrk="1" fontAlgn="auto" latinLnBrk="0" hangingPunct="1">
+              <a:lnSpc>
+                <a:spcPct val="100000"/>
+              </a:lnSpc>
+              <a:spcBef>
+                <a:spcPts val="0"/>
+              </a:spcBef>
+              <a:spcAft>
+                <a:spcPts val="0"/>
+              </a:spcAft>
+              <a:buClrTx/>
+              <a:buSzTx/>
+              <a:buFontTx/>
+              <a:buNone/>
+              <a:tabLst/>
+              <a:defRPr/>
+            </a:pPr>
+            <a:r>
+              <a:rPr lang="es-MX" sz="1200" b="0" i="0" kern="1200" dirty="0">
+                <a:solidFill>
+                  <a:schemeClr val="tx1"/>
+                </a:solidFill>
+                <a:effectLst/>
+                <a:latin typeface="+mn-lt"/>
+                <a:ea typeface="+mn-ea"/>
+                <a:cs typeface="+mn-cs"/>
+              </a:rPr>
+              <a:t>Admite estructuras de datos tales como cadenas, hashes, listas, conjuntos, conjuntos ordenados con consultas de rango, mapas de bits, </a:t>
+            </a:r>
+            <a:r>
+              <a:rPr lang="es-MX" sz="1200" b="0" i="0" kern="1200" dirty="0" err="1">
+                <a:solidFill>
+                  <a:schemeClr val="tx1"/>
+                </a:solidFill>
+                <a:effectLst/>
+                <a:latin typeface="+mn-lt"/>
+                <a:ea typeface="+mn-ea"/>
+                <a:cs typeface="+mn-cs"/>
+              </a:rPr>
+              <a:t>hiperlogálogos</a:t>
+            </a:r>
+            <a:r>
+              <a:rPr lang="es-MX" sz="1200" b="0" i="0" kern="1200" dirty="0">
+                <a:solidFill>
+                  <a:schemeClr val="tx1"/>
+                </a:solidFill>
+                <a:effectLst/>
+                <a:latin typeface="+mn-lt"/>
+                <a:ea typeface="+mn-ea"/>
+                <a:cs typeface="+mn-cs"/>
+              </a:rPr>
+              <a:t> e índices geoespaciales con consultas radiales. Redis tiene una replicación incorporada, secuencias de comandos </a:t>
+            </a:r>
+            <a:r>
+              <a:rPr lang="es-MX" sz="1200" b="0" i="0" kern="1200" dirty="0" err="1">
+                <a:solidFill>
+                  <a:schemeClr val="tx1"/>
+                </a:solidFill>
+                <a:effectLst/>
+                <a:latin typeface="+mn-lt"/>
+                <a:ea typeface="+mn-ea"/>
+                <a:cs typeface="+mn-cs"/>
+              </a:rPr>
+              <a:t>Lua</a:t>
+            </a:r>
+            <a:r>
+              <a:rPr lang="es-MX" sz="1200" b="0" i="0" kern="1200" dirty="0">
+                <a:solidFill>
+                  <a:schemeClr val="tx1"/>
+                </a:solidFill>
+                <a:effectLst/>
+                <a:latin typeface="+mn-lt"/>
+                <a:ea typeface="+mn-ea"/>
+                <a:cs typeface="+mn-cs"/>
+              </a:rPr>
+              <a:t>, desalojo LRU, transacciones y diferentes niveles de persistencia en disco, y proporciona alta disponibilidad a través de Redis </a:t>
+            </a:r>
+            <a:r>
+              <a:rPr lang="es-MX" sz="1200" b="0" i="0" kern="1200" dirty="0" err="1">
+                <a:solidFill>
+                  <a:schemeClr val="tx1"/>
+                </a:solidFill>
+                <a:effectLst/>
+                <a:latin typeface="+mn-lt"/>
+                <a:ea typeface="+mn-ea"/>
+                <a:cs typeface="+mn-cs"/>
+              </a:rPr>
+              <a:t>Sentinel</a:t>
+            </a:r>
+            <a:r>
+              <a:rPr lang="es-MX" sz="1200" b="0" i="0" kern="1200" dirty="0">
+                <a:solidFill>
+                  <a:schemeClr val="tx1"/>
+                </a:solidFill>
+                <a:effectLst/>
+                <a:latin typeface="+mn-lt"/>
+                <a:ea typeface="+mn-ea"/>
+                <a:cs typeface="+mn-cs"/>
+              </a:rPr>
+              <a:t> y particiones automáticas con Redis </a:t>
+            </a:r>
+            <a:r>
+              <a:rPr lang="es-MX" sz="1200" b="0" i="0" kern="1200" dirty="0" err="1">
+                <a:solidFill>
+                  <a:schemeClr val="tx1"/>
+                </a:solidFill>
+                <a:effectLst/>
+                <a:latin typeface="+mn-lt"/>
+                <a:ea typeface="+mn-ea"/>
+                <a:cs typeface="+mn-cs"/>
+              </a:rPr>
+              <a:t>Cluster</a:t>
+            </a:r>
+            <a:endParaRPr lang="es-CO" dirty="0"/>
+          </a:p>
+        </p:txBody>
+      </p:sp>
+      <p:sp>
+        <p:nvSpPr>
+          <p:cNvPr id="4" name="Marcador de número de diapositiva 3"/>
+          <p:cNvSpPr>
+            <a:spLocks noGrp="1"/>
+          </p:cNvSpPr>
+          <p:nvPr>
+            <p:ph type="sldNum" sz="quarter" idx="10"/>
+          </p:nvPr>
+        </p:nvSpPr>
+        <p:spPr/>
+        <p:txBody>
+          <a:bodyPr/>
+          <a:lstStyle/>
+          <a:p>
+            <a:fld id="{F82B9EC9-5510-408D-8820-096EB829DDB0}" type="slidenum">
+              <a:rPr lang="es-CO" smtClean="0"/>
+              <a:t>32</a:t>
+            </a:fld>
+            <a:endParaRPr lang="es-CO"/>
+          </a:p>
+        </p:txBody>
+      </p:sp>
+    </p:spTree>
+    <p:extLst>
+      <p:ext uri="{BB962C8B-B14F-4D97-AF65-F5344CB8AC3E}">
+        <p14:creationId xmlns:p14="http://schemas.microsoft.com/office/powerpoint/2010/main" val="3871027158"/>
+      </p:ext>
+    </p:extLst>
+  </p:cSld>
+  <p:clrMapOvr>
+    <a:masterClrMapping/>
+  </p:clrMapOvr>
+</p:notes>
+</file>
+
+<file path=ppt/notesSlides/notesSlide33.xml><?xml version="1.0" encoding="utf-8"?>
+<p:notes xmlns:a="http://schemas.openxmlformats.org/drawingml/2006/main" xmlns:r="http://schemas.openxmlformats.org/officeDocument/2006/relationships" xmlns:p="http://schemas.openxmlformats.org/presentationml/2006/main">
+  <p:cSld>
+    <p:spTree>
+      <p:nvGrpSpPr>
+        <p:cNvPr id="1" name=""/>
+        <p:cNvGrpSpPr/>
+        <p:nvPr/>
+      </p:nvGrpSpPr>
+      <p:grpSpPr>
+        <a:xfrm>
+          <a:off x="0" y="0"/>
+          <a:ext cx="0" cy="0"/>
+          <a:chOff x="0" y="0"/>
+          <a:chExt cx="0" cy="0"/>
+        </a:xfrm>
+      </p:grpSpPr>
+      <p:sp>
+        <p:nvSpPr>
+          <p:cNvPr id="2" name="Marcador de imagen de diapositiva 1"/>
+          <p:cNvSpPr>
+            <a:spLocks noGrp="1" noRot="1" noChangeAspect="1"/>
+          </p:cNvSpPr>
+          <p:nvPr>
+            <p:ph type="sldImg"/>
+          </p:nvPr>
+        </p:nvSpPr>
+        <p:spPr/>
+      </p:sp>
+      <p:sp>
+        <p:nvSpPr>
+          <p:cNvPr id="3" name="Marcador de notas 2"/>
+          <p:cNvSpPr>
+            <a:spLocks noGrp="1"/>
+          </p:cNvSpPr>
+          <p:nvPr>
+            <p:ph type="body" idx="1"/>
+          </p:nvPr>
+        </p:nvSpPr>
+        <p:spPr/>
+        <p:txBody>
+          <a:bodyPr/>
+          <a:lstStyle/>
+          <a:p>
+            <a:pPr marL="0" marR="0" lvl="0" indent="0" algn="l" defTabSz="914400" rtl="0" eaLnBrk="1" fontAlgn="auto" latinLnBrk="0" hangingPunct="1">
+              <a:lnSpc>
+                <a:spcPct val="100000"/>
+              </a:lnSpc>
+              <a:spcBef>
+                <a:spcPts val="0"/>
+              </a:spcBef>
+              <a:spcAft>
+                <a:spcPts val="0"/>
+              </a:spcAft>
+              <a:buClrTx/>
+              <a:buSzTx/>
+              <a:buFontTx/>
+              <a:buNone/>
+              <a:tabLst/>
+              <a:defRPr/>
+            </a:pPr>
+            <a:r>
+              <a:rPr lang="es-CO" sz="1200" b="1" i="0" kern="1200" dirty="0">
+                <a:solidFill>
+                  <a:schemeClr val="tx1"/>
+                </a:solidFill>
+                <a:effectLst/>
+                <a:latin typeface="+mn-lt"/>
+                <a:ea typeface="+mn-ea"/>
+                <a:cs typeface="+mn-cs"/>
+              </a:rPr>
+              <a:t>Caché de datos</a:t>
+            </a:r>
+          </a:p>
+          <a:p>
+            <a:endParaRPr lang="es-MX" sz="1200" b="0" i="0" kern="1200" dirty="0">
+              <a:solidFill>
+                <a:schemeClr val="tx1"/>
+              </a:solidFill>
+              <a:effectLst/>
+              <a:latin typeface="+mn-lt"/>
+              <a:ea typeface="+mn-ea"/>
+              <a:cs typeface="+mn-cs"/>
+            </a:endParaRPr>
+          </a:p>
+          <a:p>
+            <a:r>
+              <a:rPr lang="es-MX" sz="1200" b="0" i="0" kern="1200" dirty="0">
+                <a:solidFill>
+                  <a:schemeClr val="tx1"/>
+                </a:solidFill>
+                <a:effectLst/>
+                <a:latin typeface="+mn-lt"/>
+                <a:ea typeface="+mn-ea"/>
+                <a:cs typeface="+mn-cs"/>
+              </a:rPr>
+              <a:t>Azure Redis Cache complementa perfectamente servicios de base de datos de Azure tales como Cosmos DB. Ofrece una solución rentable para el escalado del rendimiento de lectura y escritura de la capa de datos. Almacene y comparta los resultados de consultas de bases de datos, estados de sesiones, contenido estático y mucho más con un </a:t>
+            </a:r>
+            <a:r>
+              <a:rPr lang="es-MX" sz="1200" b="0" i="0" u="none" strike="noStrike" kern="1200" dirty="0">
+                <a:solidFill>
+                  <a:schemeClr val="tx1"/>
+                </a:solidFill>
+                <a:effectLst/>
+                <a:latin typeface="+mn-lt"/>
+                <a:ea typeface="+mn-ea"/>
+                <a:cs typeface="+mn-cs"/>
+                <a:hlinkClick r:id="rId3"/>
+              </a:rPr>
+              <a:t>patrón cache-</a:t>
+            </a:r>
+            <a:r>
+              <a:rPr lang="es-MX" sz="1200" b="0" i="0" u="none" strike="noStrike" kern="1200" dirty="0" err="1">
+                <a:solidFill>
+                  <a:schemeClr val="tx1"/>
+                </a:solidFill>
+                <a:effectLst/>
+                <a:latin typeface="+mn-lt"/>
+                <a:ea typeface="+mn-ea"/>
+                <a:cs typeface="+mn-cs"/>
+                <a:hlinkClick r:id="rId3"/>
+              </a:rPr>
+              <a:t>aside</a:t>
+            </a:r>
+            <a:r>
+              <a:rPr lang="es-MX" sz="1200" b="0" i="0" kern="1200" dirty="0">
+                <a:solidFill>
+                  <a:schemeClr val="tx1"/>
+                </a:solidFill>
+                <a:effectLst/>
+                <a:latin typeface="+mn-lt"/>
+                <a:ea typeface="+mn-ea"/>
+                <a:cs typeface="+mn-cs"/>
+              </a:rPr>
+              <a:t> común.</a:t>
+            </a:r>
+            <a:endParaRPr lang="es-CO" dirty="0"/>
+          </a:p>
+        </p:txBody>
+      </p:sp>
+      <p:sp>
+        <p:nvSpPr>
+          <p:cNvPr id="4" name="Marcador de número de diapositiva 3"/>
+          <p:cNvSpPr>
+            <a:spLocks noGrp="1"/>
+          </p:cNvSpPr>
+          <p:nvPr>
+            <p:ph type="sldNum" sz="quarter" idx="10"/>
+          </p:nvPr>
+        </p:nvSpPr>
+        <p:spPr/>
+        <p:txBody>
+          <a:bodyPr/>
+          <a:lstStyle/>
+          <a:p>
+            <a:fld id="{F82B9EC9-5510-408D-8820-096EB829DDB0}" type="slidenum">
+              <a:rPr lang="es-CO" smtClean="0"/>
+              <a:t>33</a:t>
+            </a:fld>
+            <a:endParaRPr lang="es-CO"/>
+          </a:p>
+        </p:txBody>
+      </p:sp>
+    </p:spTree>
+    <p:extLst>
+      <p:ext uri="{BB962C8B-B14F-4D97-AF65-F5344CB8AC3E}">
+        <p14:creationId xmlns:p14="http://schemas.microsoft.com/office/powerpoint/2010/main" val="3454307392"/>
+      </p:ext>
+    </p:extLst>
+  </p:cSld>
+  <p:clrMapOvr>
+    <a:masterClrMapping/>
+  </p:clrMapOvr>
+</p:notes>
+</file>
+
+<file path=ppt/notesSlides/notesSlide34.xml><?xml version="1.0" encoding="utf-8"?>
+<p:notes xmlns:a="http://schemas.openxmlformats.org/drawingml/2006/main" xmlns:r="http://schemas.openxmlformats.org/officeDocument/2006/relationships" xmlns:p="http://schemas.openxmlformats.org/presentationml/2006/main">
+  <p:cSld>
+    <p:spTree>
+      <p:nvGrpSpPr>
+        <p:cNvPr id="1" name=""/>
+        <p:cNvGrpSpPr/>
+        <p:nvPr/>
+      </p:nvGrpSpPr>
+      <p:grpSpPr>
+        <a:xfrm>
+          <a:off x="0" y="0"/>
+          <a:ext cx="0" cy="0"/>
+          <a:chOff x="0" y="0"/>
+          <a:chExt cx="0" cy="0"/>
+        </a:xfrm>
+      </p:grpSpPr>
+      <p:sp>
+        <p:nvSpPr>
+          <p:cNvPr id="2" name="Marcador de imagen de diapositiva 1"/>
+          <p:cNvSpPr>
+            <a:spLocks noGrp="1" noRot="1" noChangeAspect="1"/>
+          </p:cNvSpPr>
+          <p:nvPr>
+            <p:ph type="sldImg"/>
+          </p:nvPr>
+        </p:nvSpPr>
+        <p:spPr/>
+      </p:sp>
+      <p:sp>
+        <p:nvSpPr>
+          <p:cNvPr id="3" name="Marcador de notas 2"/>
+          <p:cNvSpPr>
+            <a:spLocks noGrp="1"/>
+          </p:cNvSpPr>
+          <p:nvPr>
+            <p:ph type="body" idx="1"/>
+          </p:nvPr>
+        </p:nvSpPr>
+        <p:spPr/>
+        <p:txBody>
+          <a:bodyPr/>
+          <a:lstStyle/>
+          <a:p>
+            <a:pPr marL="0" marR="0" lvl="0" indent="0" algn="l" defTabSz="914400" rtl="0" eaLnBrk="1" fontAlgn="auto" latinLnBrk="0" hangingPunct="1">
+              <a:lnSpc>
+                <a:spcPct val="100000"/>
+              </a:lnSpc>
+              <a:spcBef>
+                <a:spcPts val="0"/>
+              </a:spcBef>
+              <a:spcAft>
+                <a:spcPts val="0"/>
+              </a:spcAft>
+              <a:buClrTx/>
+              <a:buSzTx/>
+              <a:buFontTx/>
+              <a:buNone/>
+              <a:tabLst/>
+              <a:defRPr/>
+            </a:pPr>
+            <a:r>
+              <a:rPr lang="es-CO" sz="1200" b="1" i="0" kern="1200" dirty="0">
+                <a:solidFill>
+                  <a:schemeClr val="tx1"/>
+                </a:solidFill>
+                <a:effectLst/>
+                <a:latin typeface="+mn-lt"/>
+                <a:ea typeface="+mn-ea"/>
+                <a:cs typeface="+mn-cs"/>
+              </a:rPr>
+              <a:t>Web Apps escalable</a:t>
+            </a:r>
+          </a:p>
+          <a:p>
+            <a:endParaRPr lang="es-MX" sz="1200" b="0" i="0" kern="1200" dirty="0">
+              <a:solidFill>
+                <a:schemeClr val="tx1"/>
+              </a:solidFill>
+              <a:effectLst/>
+              <a:latin typeface="+mn-lt"/>
+              <a:ea typeface="+mn-ea"/>
+              <a:cs typeface="+mn-cs"/>
+            </a:endParaRPr>
+          </a:p>
+          <a:p>
+            <a:r>
+              <a:rPr lang="es-MX" sz="1200" b="0" i="0" kern="1200" dirty="0">
+                <a:solidFill>
+                  <a:schemeClr val="tx1"/>
+                </a:solidFill>
+                <a:effectLst/>
+                <a:latin typeface="+mn-lt"/>
+                <a:ea typeface="+mn-ea"/>
+                <a:cs typeface="+mn-cs"/>
+              </a:rPr>
+              <a:t>Guarde, recupere y actualice rápidamente </a:t>
+            </a:r>
+            <a:r>
+              <a:rPr lang="es-MX" sz="1200" b="0" i="0" u="none" strike="noStrike" kern="1200" dirty="0">
+                <a:solidFill>
+                  <a:schemeClr val="tx1"/>
+                </a:solidFill>
+                <a:effectLst/>
+                <a:latin typeface="+mn-lt"/>
+                <a:ea typeface="+mn-ea"/>
+                <a:cs typeface="+mn-cs"/>
+                <a:hlinkClick r:id="rId3"/>
+              </a:rPr>
+              <a:t>datos de </a:t>
+            </a:r>
+            <a:r>
+              <a:rPr lang="es-MX" sz="1200" b="0" i="0" u="none" strike="noStrike" kern="1200" dirty="0" err="1">
+                <a:solidFill>
+                  <a:schemeClr val="tx1"/>
+                </a:solidFill>
+                <a:effectLst/>
+                <a:latin typeface="+mn-lt"/>
+                <a:ea typeface="+mn-ea"/>
+                <a:cs typeface="+mn-cs"/>
+                <a:hlinkClick r:id="rId3"/>
+              </a:rPr>
+              <a:t>sesión</a:t>
+            </a:r>
+            <a:r>
+              <a:rPr lang="es-MX" sz="1200" b="0" i="0" kern="1200" dirty="0" err="1">
+                <a:solidFill>
+                  <a:schemeClr val="tx1"/>
+                </a:solidFill>
+                <a:effectLst/>
+                <a:latin typeface="+mn-lt"/>
+                <a:ea typeface="+mn-ea"/>
+                <a:cs typeface="+mn-cs"/>
+              </a:rPr>
+              <a:t>web</a:t>
+            </a:r>
+            <a:r>
+              <a:rPr lang="es-MX" sz="1200" b="0" i="0" kern="1200" dirty="0">
+                <a:solidFill>
+                  <a:schemeClr val="tx1"/>
+                </a:solidFill>
+                <a:effectLst/>
+                <a:latin typeface="+mn-lt"/>
+                <a:ea typeface="+mn-ea"/>
+                <a:cs typeface="+mn-cs"/>
+              </a:rPr>
+              <a:t> tales como las cookies de usuario y las </a:t>
+            </a:r>
+            <a:r>
+              <a:rPr lang="es-MX" sz="1200" b="0" i="0" u="none" strike="noStrike" kern="1200" dirty="0">
+                <a:solidFill>
+                  <a:schemeClr val="tx1"/>
+                </a:solidFill>
+                <a:effectLst/>
+                <a:latin typeface="+mn-lt"/>
+                <a:ea typeface="+mn-ea"/>
+                <a:cs typeface="+mn-cs"/>
+                <a:hlinkClick r:id="rId4"/>
+              </a:rPr>
+              <a:t>páginas de resultados</a:t>
+            </a:r>
+            <a:r>
+              <a:rPr lang="es-MX" sz="1200" b="0" i="0" kern="1200" dirty="0">
+                <a:solidFill>
+                  <a:schemeClr val="tx1"/>
+                </a:solidFill>
+                <a:effectLst/>
+                <a:latin typeface="+mn-lt"/>
+                <a:ea typeface="+mn-ea"/>
+                <a:cs typeface="+mn-cs"/>
+              </a:rPr>
+              <a:t>. Azure Redis Cache mejora el rendimiento de la aplicación aumentando su capacidad de respuesta y permitiéndole controlar cargas crecientes con menos recursos de proceso web.</a:t>
+            </a:r>
+            <a:endParaRPr lang="es-CO" dirty="0"/>
+          </a:p>
+        </p:txBody>
+      </p:sp>
+      <p:sp>
+        <p:nvSpPr>
+          <p:cNvPr id="4" name="Marcador de número de diapositiva 3"/>
+          <p:cNvSpPr>
+            <a:spLocks noGrp="1"/>
+          </p:cNvSpPr>
+          <p:nvPr>
+            <p:ph type="sldNum" sz="quarter" idx="10"/>
+          </p:nvPr>
+        </p:nvSpPr>
+        <p:spPr/>
+        <p:txBody>
+          <a:bodyPr/>
+          <a:lstStyle/>
+          <a:p>
+            <a:fld id="{F82B9EC9-5510-408D-8820-096EB829DDB0}" type="slidenum">
+              <a:rPr lang="es-CO" smtClean="0"/>
+              <a:t>34</a:t>
+            </a:fld>
+            <a:endParaRPr lang="es-CO"/>
+          </a:p>
+        </p:txBody>
+      </p:sp>
+    </p:spTree>
+    <p:extLst>
+      <p:ext uri="{BB962C8B-B14F-4D97-AF65-F5344CB8AC3E}">
+        <p14:creationId xmlns:p14="http://schemas.microsoft.com/office/powerpoint/2010/main" val="365966739"/>
+      </p:ext>
+    </p:extLst>
+  </p:cSld>
+  <p:clrMapOvr>
+    <a:masterClrMapping/>
+  </p:clrMapOvr>
+</p:notes>
+</file>
+
+<file path=ppt/notesSlides/notesSlide35.xml><?xml version="1.0" encoding="utf-8"?>
+<p:notes xmlns:a="http://schemas.openxmlformats.org/drawingml/2006/main" xmlns:r="http://schemas.openxmlformats.org/officeDocument/2006/relationships" xmlns:p="http://schemas.openxmlformats.org/presentationml/2006/main">
+  <p:cSld>
+    <p:spTree>
+      <p:nvGrpSpPr>
+        <p:cNvPr id="1" name=""/>
+        <p:cNvGrpSpPr/>
+        <p:nvPr/>
+      </p:nvGrpSpPr>
+      <p:grpSpPr>
+        <a:xfrm>
+          <a:off x="0" y="0"/>
+          <a:ext cx="0" cy="0"/>
+          <a:chOff x="0" y="0"/>
+          <a:chExt cx="0" cy="0"/>
+        </a:xfrm>
+      </p:grpSpPr>
+      <p:sp>
+        <p:nvSpPr>
+          <p:cNvPr id="2" name="Marcador de imagen de diapositiva 1"/>
+          <p:cNvSpPr>
+            <a:spLocks noGrp="1" noRot="1" noChangeAspect="1"/>
+          </p:cNvSpPr>
+          <p:nvPr>
+            <p:ph type="sldImg"/>
+          </p:nvPr>
+        </p:nvSpPr>
+        <p:spPr/>
+      </p:sp>
+      <p:sp>
+        <p:nvSpPr>
+          <p:cNvPr id="3" name="Marcador de notas 2"/>
+          <p:cNvSpPr>
+            <a:spLocks noGrp="1"/>
+          </p:cNvSpPr>
+          <p:nvPr>
+            <p:ph type="body" idx="1"/>
+          </p:nvPr>
+        </p:nvSpPr>
+        <p:spPr/>
+        <p:txBody>
+          <a:bodyPr/>
+          <a:lstStyle/>
+          <a:p>
+            <a:r>
+              <a:rPr lang="es-MX" sz="1200" b="1" i="0" kern="1200" dirty="0">
+                <a:solidFill>
+                  <a:schemeClr val="tx1"/>
+                </a:solidFill>
+                <a:effectLst/>
+                <a:latin typeface="+mn-lt"/>
+                <a:ea typeface="+mn-ea"/>
+                <a:cs typeface="+mn-cs"/>
+              </a:rPr>
+              <a:t>Mensajería</a:t>
+            </a:r>
+          </a:p>
+          <a:p>
+            <a:r>
+              <a:rPr lang="es-MX" sz="1200" b="0" i="0" kern="1200" dirty="0">
+                <a:solidFill>
+                  <a:schemeClr val="tx1"/>
+                </a:solidFill>
+                <a:effectLst/>
+                <a:latin typeface="+mn-lt"/>
+                <a:ea typeface="+mn-ea"/>
+                <a:cs typeface="+mn-cs"/>
+              </a:rPr>
+              <a:t>Azure Redis Cache admite funcionalidades de publicación y suscripción. Es perfecto para enrutar mensajes en tiempo real y escalar verticalmente marcos de comunicación web tales como </a:t>
+            </a:r>
+            <a:r>
+              <a:rPr lang="es-MX" sz="1200" b="0" i="0" u="none" strike="noStrike" kern="1200" dirty="0" err="1">
+                <a:solidFill>
+                  <a:schemeClr val="tx1"/>
+                </a:solidFill>
+                <a:effectLst/>
+                <a:latin typeface="+mn-lt"/>
+                <a:ea typeface="+mn-ea"/>
+                <a:cs typeface="+mn-cs"/>
+                <a:hlinkClick r:id="rId3"/>
+              </a:rPr>
+              <a:t>SignalR</a:t>
+            </a:r>
+            <a:r>
+              <a:rPr lang="es-MX" sz="1200" b="0" i="0" kern="1200" dirty="0">
+                <a:solidFill>
+                  <a:schemeClr val="tx1"/>
+                </a:solidFill>
+                <a:effectLst/>
+                <a:latin typeface="+mn-lt"/>
+                <a:ea typeface="+mn-ea"/>
+                <a:cs typeface="+mn-cs"/>
+              </a:rPr>
+              <a:t>.</a:t>
+            </a:r>
+          </a:p>
+        </p:txBody>
+      </p:sp>
+      <p:sp>
+        <p:nvSpPr>
+          <p:cNvPr id="4" name="Marcador de número de diapositiva 3"/>
+          <p:cNvSpPr>
+            <a:spLocks noGrp="1"/>
+          </p:cNvSpPr>
+          <p:nvPr>
+            <p:ph type="sldNum" sz="quarter" idx="10"/>
+          </p:nvPr>
+        </p:nvSpPr>
+        <p:spPr/>
+        <p:txBody>
+          <a:bodyPr/>
+          <a:lstStyle/>
+          <a:p>
+            <a:fld id="{F82B9EC9-5510-408D-8820-096EB829DDB0}" type="slidenum">
+              <a:rPr lang="es-CO" smtClean="0"/>
+              <a:t>35</a:t>
+            </a:fld>
+            <a:endParaRPr lang="es-CO"/>
+          </a:p>
+        </p:txBody>
+      </p:sp>
+    </p:spTree>
+    <p:extLst>
+      <p:ext uri="{BB962C8B-B14F-4D97-AF65-F5344CB8AC3E}">
+        <p14:creationId xmlns:p14="http://schemas.microsoft.com/office/powerpoint/2010/main" val="360802577"/>
+      </p:ext>
+    </p:extLst>
+  </p:cSld>
+  <p:clrMapOvr>
+    <a:masterClrMapping/>
+  </p:clrMapOvr>
+</p:notes>
+</file>
+
 <file path=ppt/notesSlides/notesSlide4.xml><?xml version="1.0" encoding="utf-8"?>
 <p:notes xmlns:a="http://schemas.openxmlformats.org/drawingml/2006/main" xmlns:r="http://schemas.openxmlformats.org/officeDocument/2006/relationships" xmlns:p="http://schemas.openxmlformats.org/presentationml/2006/main">
   <p:cSld>
@@ -4246,7 +5081,7 @@
           <a:p>
             <a:fld id="{E5D78773-9131-404C-ACB3-62F3C9BC13CF}" type="datetimeFigureOut">
               <a:rPr lang="es-CO" smtClean="0"/>
-              <a:t>24/07/2018</a:t>
+              <a:t>27/07/2018</a:t>
             </a:fld>
             <a:endParaRPr lang="es-CO"/>
           </a:p>
@@ -4446,7 +5281,7 @@
           <a:p>
             <a:fld id="{8A8E3610-CFDD-4880-BAB4-3CD60D9C7275}" type="datetimeFigureOut">
               <a:rPr lang="es-CO" smtClean="0"/>
-              <a:t>24/07/2018</a:t>
+              <a:t>27/07/2018</a:t>
             </a:fld>
             <a:endParaRPr lang="es-CO"/>
           </a:p>
@@ -4656,7 +5491,7 @@
           <a:p>
             <a:fld id="{8A8E3610-CFDD-4880-BAB4-3CD60D9C7275}" type="datetimeFigureOut">
               <a:rPr lang="es-CO" smtClean="0"/>
-              <a:t>24/07/2018</a:t>
+              <a:t>27/07/2018</a:t>
             </a:fld>
             <a:endParaRPr lang="es-CO"/>
           </a:p>
@@ -4992,7 +5827,7 @@
           <a:p>
             <a:fld id="{8A8E3610-CFDD-4880-BAB4-3CD60D9C7275}" type="datetimeFigureOut">
               <a:rPr lang="es-CO" smtClean="0"/>
-              <a:t>24/07/2018</a:t>
+              <a:t>27/07/2018</a:t>
             </a:fld>
             <a:endParaRPr lang="es-CO"/>
           </a:p>
@@ -5268,7 +6103,7 @@
           <a:p>
             <a:fld id="{8A8E3610-CFDD-4880-BAB4-3CD60D9C7275}" type="datetimeFigureOut">
               <a:rPr lang="es-CO" smtClean="0"/>
-              <a:t>24/07/2018</a:t>
+              <a:t>27/07/2018</a:t>
             </a:fld>
             <a:endParaRPr lang="es-CO"/>
           </a:p>
@@ -5536,7 +6371,7 @@
           <a:p>
             <a:fld id="{8A8E3610-CFDD-4880-BAB4-3CD60D9C7275}" type="datetimeFigureOut">
               <a:rPr lang="es-CO" smtClean="0"/>
-              <a:t>24/07/2018</a:t>
+              <a:t>27/07/2018</a:t>
             </a:fld>
             <a:endParaRPr lang="es-CO"/>
           </a:p>
@@ -5951,7 +6786,7 @@
           <a:p>
             <a:fld id="{8A8E3610-CFDD-4880-BAB4-3CD60D9C7275}" type="datetimeFigureOut">
               <a:rPr lang="es-CO" smtClean="0"/>
-              <a:t>24/07/2018</a:t>
+              <a:t>27/07/2018</a:t>
             </a:fld>
             <a:endParaRPr lang="es-CO"/>
           </a:p>
@@ -6168,7 +7003,7 @@
           <a:p>
             <a:fld id="{8A8E3610-CFDD-4880-BAB4-3CD60D9C7275}" type="datetimeFigureOut">
               <a:rPr lang="es-CO" smtClean="0"/>
-              <a:t>24/07/2018</a:t>
+              <a:t>27/07/2018</a:t>
             </a:fld>
             <a:endParaRPr lang="es-CO"/>
           </a:p>
@@ -6481,7 +7316,7 @@
           <a:p>
             <a:fld id="{8A8E3610-CFDD-4880-BAB4-3CD60D9C7275}" type="datetimeFigureOut">
               <a:rPr lang="es-CO" smtClean="0"/>
-              <a:t>24/07/2018</a:t>
+              <a:t>27/07/2018</a:t>
             </a:fld>
             <a:endParaRPr lang="es-CO"/>
           </a:p>
@@ -6770,7 +7605,7 @@
           <a:p>
             <a:fld id="{8A8E3610-CFDD-4880-BAB4-3CD60D9C7275}" type="datetimeFigureOut">
               <a:rPr lang="es-CO" smtClean="0"/>
-              <a:t>24/07/2018</a:t>
+              <a:t>27/07/2018</a:t>
             </a:fld>
             <a:endParaRPr lang="es-CO"/>
           </a:p>
@@ -7013,7 +7848,7 @@
           <a:p>
             <a:fld id="{E5D78773-9131-404C-ACB3-62F3C9BC13CF}" type="datetimeFigureOut">
               <a:rPr lang="es-CO" smtClean="0"/>
-              <a:t>24/07/2018</a:t>
+              <a:t>27/07/2018</a:t>
             </a:fld>
             <a:endParaRPr lang="es-CO"/>
           </a:p>
@@ -13951,6 +14786,1255 @@
     <p:extLst>
       <p:ext uri="{BB962C8B-B14F-4D97-AF65-F5344CB8AC3E}">
         <p14:creationId xmlns:p14="http://schemas.microsoft.com/office/powerpoint/2010/main" val="3006746543"/>
+      </p:ext>
+    </p:extLst>
+  </p:cSld>
+  <p:clrMapOvr>
+    <a:masterClrMapping/>
+  </p:clrMapOvr>
+</p:sld>
+</file>
+
+<file path=ppt/slides/slide31.xml><?xml version="1.0" encoding="utf-8"?>
+<p:sld xmlns:a="http://schemas.openxmlformats.org/drawingml/2006/main" xmlns:r="http://schemas.openxmlformats.org/officeDocument/2006/relationships" xmlns:p="http://schemas.openxmlformats.org/presentationml/2006/main">
+  <p:cSld>
+    <p:bg>
+      <p:bgPr>
+        <a:solidFill>
+          <a:schemeClr val="bg1"/>
+        </a:solidFill>
+        <a:effectLst/>
+      </p:bgPr>
+    </p:bg>
+    <p:spTree>
+      <p:nvGrpSpPr>
+        <p:cNvPr id="1" name=""/>
+        <p:cNvGrpSpPr/>
+        <p:nvPr/>
+      </p:nvGrpSpPr>
+      <p:grpSpPr>
+        <a:xfrm>
+          <a:off x="0" y="0"/>
+          <a:ext cx="0" cy="0"/>
+          <a:chOff x="0" y="0"/>
+          <a:chExt cx="0" cy="0"/>
+        </a:xfrm>
+      </p:grpSpPr>
+      <p:sp>
+        <p:nvSpPr>
+          <p:cNvPr id="9" name="Rectangle 8">
+            <a:extLst>
+              <a:ext uri="{FF2B5EF4-FFF2-40B4-BE49-F238E27FC236}">
+                <a16:creationId xmlns:a16="http://schemas.microsoft.com/office/drawing/2014/main" id="{A4AC5506-6312-4701-8D3C-40187889A947}"/>
+              </a:ext>
+              <a:ext uri="{C183D7F6-B498-43B3-948B-1728B52AA6E4}">
+                <adec:decorative xmlns:adec="http://schemas.microsoft.com/office/drawing/2017/decorative" val="1"/>
+              </a:ext>
+            </a:extLst>
+          </p:cNvPr>
+          <p:cNvSpPr>
+            <a:spLocks noGrp="1" noRot="1" noChangeAspect="1" noMove="1" noResize="1" noEditPoints="1" noAdjustHandles="1" noChangeArrowheads="1" noChangeShapeType="1" noTextEdit="1"/>
+          </p:cNvSpPr>
+          <p:nvPr>
+            <p:extLst>
+              <p:ext uri="{386F3935-93C4-4BCD-93E2-E3B085C9AB24}">
+                <p16:designElem xmlns:p16="http://schemas.microsoft.com/office/powerpoint/2015/main" val="1"/>
+              </p:ext>
+            </p:extLst>
+          </p:nvPr>
+        </p:nvSpPr>
+        <p:spPr>
+          <a:xfrm>
+            <a:off x="0" y="651752"/>
+            <a:ext cx="12192000" cy="736551"/>
+          </a:xfrm>
+          <a:prstGeom prst="rect">
+            <a:avLst/>
+          </a:prstGeom>
+          <a:solidFill>
+            <a:schemeClr val="tx1"/>
+          </a:solidFill>
+          <a:ln>
+            <a:noFill/>
+          </a:ln>
+        </p:spPr>
+        <p:style>
+          <a:lnRef idx="2">
+            <a:schemeClr val="accent1">
+              <a:shade val="50000"/>
+            </a:schemeClr>
+          </a:lnRef>
+          <a:fillRef idx="1">
+            <a:schemeClr val="accent1"/>
+          </a:fillRef>
+          <a:effectRef idx="0">
+            <a:schemeClr val="accent1"/>
+          </a:effectRef>
+          <a:fontRef idx="minor">
+            <a:schemeClr val="lt1"/>
+          </a:fontRef>
+        </p:style>
+        <p:txBody>
+          <a:bodyPr rtlCol="0" anchor="ctr"/>
+          <a:lstStyle/>
+          <a:p>
+            <a:pPr algn="ctr"/>
+            <a:endParaRPr lang="en-US"/>
+          </a:p>
+        </p:txBody>
+      </p:sp>
+      <p:sp>
+        <p:nvSpPr>
+          <p:cNvPr id="2" name="CuadroTexto 1">
+            <a:extLst>
+              <a:ext uri="{FF2B5EF4-FFF2-40B4-BE49-F238E27FC236}">
+                <a16:creationId xmlns:a16="http://schemas.microsoft.com/office/drawing/2014/main" id="{A7F3F451-89EE-48EF-AB36-D9F6082585A1}"/>
+              </a:ext>
+            </a:extLst>
+          </p:cNvPr>
+          <p:cNvSpPr txBox="1"/>
+          <p:nvPr/>
+        </p:nvSpPr>
+        <p:spPr>
+          <a:xfrm>
+            <a:off x="556532" y="643467"/>
+            <a:ext cx="11210925" cy="744836"/>
+          </a:xfrm>
+          <a:prstGeom prst="rect">
+            <a:avLst/>
+          </a:prstGeom>
+        </p:spPr>
+        <p:txBody>
+          <a:bodyPr vert="horz" lIns="91440" tIns="45720" rIns="91440" bIns="45720" rtlCol="0" anchor="ctr">
+            <a:normAutofit/>
+          </a:bodyPr>
+          <a:lstStyle/>
+          <a:p>
+            <a:pPr algn="ctr">
+              <a:lnSpc>
+                <a:spcPct val="90000"/>
+              </a:lnSpc>
+              <a:spcBef>
+                <a:spcPct val="0"/>
+              </a:spcBef>
+              <a:spcAft>
+                <a:spcPts val="600"/>
+              </a:spcAft>
+            </a:pPr>
+            <a:r>
+              <a:rPr lang="en-US" sz="3200" kern="1200">
+                <a:solidFill>
+                  <a:schemeClr val="bg1"/>
+                </a:solidFill>
+                <a:latin typeface="+mj-lt"/>
+                <a:ea typeface="+mj-ea"/>
+                <a:cs typeface="+mj-cs"/>
+              </a:rPr>
+              <a:t>Redis cache</a:t>
+            </a:r>
+          </a:p>
+        </p:txBody>
+      </p:sp>
+      <p:sp>
+        <p:nvSpPr>
+          <p:cNvPr id="7" name="CuadroTexto 6">
+            <a:extLst>
+              <a:ext uri="{FF2B5EF4-FFF2-40B4-BE49-F238E27FC236}">
+                <a16:creationId xmlns:a16="http://schemas.microsoft.com/office/drawing/2014/main" id="{B4E5B3F0-DFEF-4D3C-A5F4-F20B126E71D8}"/>
+              </a:ext>
+            </a:extLst>
+          </p:cNvPr>
+          <p:cNvSpPr txBox="1"/>
+          <p:nvPr/>
+        </p:nvSpPr>
+        <p:spPr>
+          <a:xfrm>
+            <a:off x="3545316" y="1927021"/>
+            <a:ext cx="6203108" cy="707886"/>
+          </a:xfrm>
+          <a:prstGeom prst="rect">
+            <a:avLst/>
+          </a:prstGeom>
+          <a:noFill/>
+        </p:spPr>
+        <p:txBody>
+          <a:bodyPr wrap="none" rtlCol="0">
+            <a:spAutoFit/>
+          </a:bodyPr>
+          <a:lstStyle/>
+          <a:p>
+            <a:r>
+              <a:rPr lang="es-MX" sz="4000" dirty="0">
+                <a:latin typeface="Segoe UI" panose="020B0502040204020203" pitchFamily="34" charset="0"/>
+                <a:cs typeface="Segoe UI" panose="020B0502040204020203" pitchFamily="34" charset="0"/>
+              </a:rPr>
+              <a:t>Base de datos en Memoria</a:t>
+            </a:r>
+            <a:endParaRPr lang="es-CO" sz="4000" dirty="0">
+              <a:latin typeface="Segoe UI" panose="020B0502040204020203" pitchFamily="34" charset="0"/>
+              <a:cs typeface="Segoe UI" panose="020B0502040204020203" pitchFamily="34" charset="0"/>
+            </a:endParaRPr>
+          </a:p>
+        </p:txBody>
+      </p:sp>
+      <p:sp>
+        <p:nvSpPr>
+          <p:cNvPr id="8" name="CuadroTexto 7">
+            <a:extLst>
+              <a:ext uri="{FF2B5EF4-FFF2-40B4-BE49-F238E27FC236}">
+                <a16:creationId xmlns:a16="http://schemas.microsoft.com/office/drawing/2014/main" id="{0FAE065B-1F7D-4E3E-86C1-FD128498E48E}"/>
+              </a:ext>
+            </a:extLst>
+          </p:cNvPr>
+          <p:cNvSpPr txBox="1"/>
+          <p:nvPr/>
+        </p:nvSpPr>
+        <p:spPr>
+          <a:xfrm>
+            <a:off x="4971681" y="2951946"/>
+            <a:ext cx="4596862" cy="954107"/>
+          </a:xfrm>
+          <a:prstGeom prst="rect">
+            <a:avLst/>
+          </a:prstGeom>
+          <a:noFill/>
+        </p:spPr>
+        <p:txBody>
+          <a:bodyPr wrap="square" rtlCol="0">
+            <a:spAutoFit/>
+          </a:bodyPr>
+          <a:lstStyle/>
+          <a:p>
+            <a:r>
+              <a:rPr lang="es-CO" sz="2800" dirty="0">
+                <a:latin typeface="Segoe UI" panose="020B0502040204020203" pitchFamily="34" charset="0"/>
+                <a:cs typeface="Segoe UI" panose="020B0502040204020203" pitchFamily="34" charset="0"/>
+                <a:hlinkClick r:id="rId3"/>
+              </a:rPr>
+              <a:t>https://redis.io/</a:t>
+            </a:r>
+            <a:endParaRPr lang="es-CO" sz="2800" dirty="0">
+              <a:latin typeface="Segoe UI" panose="020B0502040204020203" pitchFamily="34" charset="0"/>
+              <a:cs typeface="Segoe UI" panose="020B0502040204020203" pitchFamily="34" charset="0"/>
+            </a:endParaRPr>
+          </a:p>
+          <a:p>
+            <a:endParaRPr lang="es-CO" sz="2800" dirty="0">
+              <a:latin typeface="Segoe UI" panose="020B0502040204020203" pitchFamily="34" charset="0"/>
+              <a:cs typeface="Segoe UI" panose="020B0502040204020203" pitchFamily="34" charset="0"/>
+            </a:endParaRPr>
+          </a:p>
+        </p:txBody>
+      </p:sp>
+      <p:sp>
+        <p:nvSpPr>
+          <p:cNvPr id="11" name="CuadroTexto 10">
+            <a:extLst>
+              <a:ext uri="{FF2B5EF4-FFF2-40B4-BE49-F238E27FC236}">
+                <a16:creationId xmlns:a16="http://schemas.microsoft.com/office/drawing/2014/main" id="{D9EA81B4-7103-46A0-AEC2-39143E794D92}"/>
+              </a:ext>
+            </a:extLst>
+          </p:cNvPr>
+          <p:cNvSpPr txBox="1"/>
+          <p:nvPr/>
+        </p:nvSpPr>
+        <p:spPr>
+          <a:xfrm>
+            <a:off x="3153430" y="4223092"/>
+            <a:ext cx="6743834" cy="707886"/>
+          </a:xfrm>
+          <a:prstGeom prst="rect">
+            <a:avLst/>
+          </a:prstGeom>
+          <a:noFill/>
+        </p:spPr>
+        <p:txBody>
+          <a:bodyPr wrap="none" rtlCol="0">
+            <a:spAutoFit/>
+          </a:bodyPr>
+          <a:lstStyle/>
+          <a:p>
+            <a:r>
+              <a:rPr lang="es-MX" sz="4000" dirty="0">
+                <a:latin typeface="Segoe UI" panose="020B0502040204020203" pitchFamily="34" charset="0"/>
+                <a:cs typeface="Segoe UI" panose="020B0502040204020203" pitchFamily="34" charset="0"/>
+              </a:rPr>
+              <a:t>Se recomienda usar SO Linux</a:t>
+            </a:r>
+            <a:endParaRPr lang="es-CO" sz="4000" dirty="0">
+              <a:latin typeface="Segoe UI" panose="020B0502040204020203" pitchFamily="34" charset="0"/>
+              <a:cs typeface="Segoe UI" panose="020B0502040204020203" pitchFamily="34" charset="0"/>
+            </a:endParaRPr>
+          </a:p>
+        </p:txBody>
+      </p:sp>
+      <p:pic>
+        <p:nvPicPr>
+          <p:cNvPr id="1028" name="Picture 4" descr="Resultado de imagen para redis">
+            <a:extLst>
+              <a:ext uri="{FF2B5EF4-FFF2-40B4-BE49-F238E27FC236}">
+                <a16:creationId xmlns:a16="http://schemas.microsoft.com/office/drawing/2014/main" id="{8AB3634D-A73C-41BF-8CA7-569F5A5A00F1}"/>
+              </a:ext>
+            </a:extLst>
+          </p:cNvPr>
+          <p:cNvPicPr>
+            <a:picLocks noChangeAspect="1" noChangeArrowheads="1"/>
+          </p:cNvPicPr>
+          <p:nvPr/>
+        </p:nvPicPr>
+        <p:blipFill>
+          <a:blip r:embed="rId4">
+            <a:extLst>
+              <a:ext uri="{28A0092B-C50C-407E-A947-70E740481C1C}">
+                <a14:useLocalDpi xmlns:a14="http://schemas.microsoft.com/office/drawing/2010/main" val="0"/>
+              </a:ext>
+            </a:extLst>
+          </a:blip>
+          <a:srcRect/>
+          <a:stretch>
+            <a:fillRect/>
+          </a:stretch>
+        </p:blipFill>
+        <p:spPr bwMode="auto">
+          <a:xfrm>
+            <a:off x="4806041" y="5629285"/>
+            <a:ext cx="3117177" cy="1041657"/>
+          </a:xfrm>
+          <a:prstGeom prst="rect">
+            <a:avLst/>
+          </a:prstGeom>
+          <a:noFill/>
+          <a:extLst>
+            <a:ext uri="{909E8E84-426E-40DD-AFC4-6F175D3DCCD1}">
+              <a14:hiddenFill xmlns:a14="http://schemas.microsoft.com/office/drawing/2010/main">
+                <a:solidFill>
+                  <a:srgbClr val="FFFFFF"/>
+                </a:solidFill>
+              </a14:hiddenFill>
+            </a:ext>
+          </a:extLst>
+        </p:spPr>
+      </p:pic>
+    </p:spTree>
+    <p:extLst>
+      <p:ext uri="{BB962C8B-B14F-4D97-AF65-F5344CB8AC3E}">
+        <p14:creationId xmlns:p14="http://schemas.microsoft.com/office/powerpoint/2010/main" val="3944266583"/>
+      </p:ext>
+    </p:extLst>
+  </p:cSld>
+  <p:clrMapOvr>
+    <a:masterClrMapping/>
+  </p:clrMapOvr>
+</p:sld>
+</file>
+
+<file path=ppt/slides/slide32.xml><?xml version="1.0" encoding="utf-8"?>
+<p:sld xmlns:a="http://schemas.openxmlformats.org/drawingml/2006/main" xmlns:r="http://schemas.openxmlformats.org/officeDocument/2006/relationships" xmlns:p="http://schemas.openxmlformats.org/presentationml/2006/main">
+  <p:cSld>
+    <p:bg>
+      <p:bgPr>
+        <a:solidFill>
+          <a:schemeClr val="bg1"/>
+        </a:solidFill>
+        <a:effectLst/>
+      </p:bgPr>
+    </p:bg>
+    <p:spTree>
+      <p:nvGrpSpPr>
+        <p:cNvPr id="1" name=""/>
+        <p:cNvGrpSpPr/>
+        <p:nvPr/>
+      </p:nvGrpSpPr>
+      <p:grpSpPr>
+        <a:xfrm>
+          <a:off x="0" y="0"/>
+          <a:ext cx="0" cy="0"/>
+          <a:chOff x="0" y="0"/>
+          <a:chExt cx="0" cy="0"/>
+        </a:xfrm>
+      </p:grpSpPr>
+      <p:sp>
+        <p:nvSpPr>
+          <p:cNvPr id="14" name="Rectangle 13">
+            <a:extLst>
+              <a:ext uri="{FF2B5EF4-FFF2-40B4-BE49-F238E27FC236}">
+                <a16:creationId xmlns:a16="http://schemas.microsoft.com/office/drawing/2014/main" id="{8D70B121-56F4-4848-B38B-182089D909FA}"/>
+              </a:ext>
+              <a:ext uri="{C183D7F6-B498-43B3-948B-1728B52AA6E4}">
+                <adec:decorative xmlns:adec="http://schemas.microsoft.com/office/drawing/2017/decorative" val="1"/>
+              </a:ext>
+            </a:extLst>
+          </p:cNvPr>
+          <p:cNvSpPr>
+            <a:spLocks noGrp="1" noRot="1" noChangeAspect="1" noMove="1" noResize="1" noEditPoints="1" noAdjustHandles="1" noChangeArrowheads="1" noChangeShapeType="1" noTextEdit="1"/>
+          </p:cNvSpPr>
+          <p:nvPr>
+            <p:extLst>
+              <p:ext uri="{386F3935-93C4-4BCD-93E2-E3B085C9AB24}">
+                <p16:designElem xmlns:p16="http://schemas.microsoft.com/office/powerpoint/2015/main" val="1"/>
+              </p:ext>
+            </p:extLst>
+          </p:nvPr>
+        </p:nvSpPr>
+        <p:spPr bwMode="ltGray">
+          <a:xfrm>
+            <a:off x="321564" y="320040"/>
+            <a:ext cx="11548872" cy="6217920"/>
+          </a:xfrm>
+          <a:prstGeom prst="rect">
+            <a:avLst/>
+          </a:prstGeom>
+          <a:solidFill>
+            <a:schemeClr val="tx1">
+              <a:alpha val="8000"/>
+            </a:schemeClr>
+          </a:solidFill>
+          <a:ln w="127000" cap="sq" cmpd="thinThick">
+            <a:noFill/>
+          </a:ln>
+        </p:spPr>
+        <p:style>
+          <a:lnRef idx="2">
+            <a:schemeClr val="accent1">
+              <a:shade val="50000"/>
+            </a:schemeClr>
+          </a:lnRef>
+          <a:fillRef idx="1">
+            <a:schemeClr val="accent1"/>
+          </a:fillRef>
+          <a:effectRef idx="0">
+            <a:schemeClr val="accent1"/>
+          </a:effectRef>
+          <a:fontRef idx="minor">
+            <a:schemeClr val="lt1"/>
+          </a:fontRef>
+        </p:style>
+        <p:txBody>
+          <a:bodyPr rtlCol="0" anchor="ctr"/>
+          <a:lstStyle/>
+          <a:p>
+            <a:pPr algn="ctr"/>
+            <a:endParaRPr lang="en-US"/>
+          </a:p>
+        </p:txBody>
+      </p:sp>
+      <p:sp>
+        <p:nvSpPr>
+          <p:cNvPr id="2" name="CuadroTexto 1">
+            <a:extLst>
+              <a:ext uri="{FF2B5EF4-FFF2-40B4-BE49-F238E27FC236}">
+                <a16:creationId xmlns:a16="http://schemas.microsoft.com/office/drawing/2014/main" id="{A7F3F451-89EE-48EF-AB36-D9F6082585A1}"/>
+              </a:ext>
+            </a:extLst>
+          </p:cNvPr>
+          <p:cNvSpPr txBox="1"/>
+          <p:nvPr/>
+        </p:nvSpPr>
+        <p:spPr>
+          <a:xfrm>
+            <a:off x="838200" y="963877"/>
+            <a:ext cx="3494362" cy="4930246"/>
+          </a:xfrm>
+          <a:prstGeom prst="rect">
+            <a:avLst/>
+          </a:prstGeom>
+        </p:spPr>
+        <p:txBody>
+          <a:bodyPr vert="horz" lIns="91440" tIns="45720" rIns="91440" bIns="45720" rtlCol="0" anchor="ctr">
+            <a:normAutofit/>
+          </a:bodyPr>
+          <a:lstStyle/>
+          <a:p>
+            <a:pPr algn="r">
+              <a:lnSpc>
+                <a:spcPct val="90000"/>
+              </a:lnSpc>
+              <a:spcBef>
+                <a:spcPct val="0"/>
+              </a:spcBef>
+              <a:spcAft>
+                <a:spcPts val="600"/>
+              </a:spcAft>
+            </a:pPr>
+            <a:r>
+              <a:rPr lang="en-US" sz="4400" kern="1200">
+                <a:solidFill>
+                  <a:schemeClr val="accent1"/>
+                </a:solidFill>
+                <a:latin typeface="+mj-lt"/>
+                <a:ea typeface="+mj-ea"/>
+                <a:cs typeface="+mj-cs"/>
+              </a:rPr>
+              <a:t>Redis cache</a:t>
+            </a:r>
+          </a:p>
+        </p:txBody>
+      </p:sp>
+      <p:cxnSp>
+        <p:nvCxnSpPr>
+          <p:cNvPr id="16" name="Straight Connector 15">
+            <a:extLst>
+              <a:ext uri="{FF2B5EF4-FFF2-40B4-BE49-F238E27FC236}">
+                <a16:creationId xmlns:a16="http://schemas.microsoft.com/office/drawing/2014/main" id="{2D72A2C9-F3CA-4216-8BAD-FA4C970C3C4E}"/>
+              </a:ext>
+              <a:ext uri="{C183D7F6-B498-43B3-948B-1728B52AA6E4}">
+                <adec:decorative xmlns:adec="http://schemas.microsoft.com/office/drawing/2017/decorative" val="1"/>
+              </a:ext>
+            </a:extLst>
+          </p:cNvPr>
+          <p:cNvCxnSpPr>
+            <a:cxnSpLocks noGrp="1" noRot="1" noChangeAspect="1" noMove="1" noResize="1" noEditPoints="1" noAdjustHandles="1" noChangeArrowheads="1" noChangeShapeType="1"/>
+          </p:cNvCxnSpPr>
+          <p:nvPr>
+            <p:extLst>
+              <p:ext uri="{386F3935-93C4-4BCD-93E2-E3B085C9AB24}">
+                <p16:designElem xmlns:p16="http://schemas.microsoft.com/office/powerpoint/2015/main" val="1"/>
+              </p:ext>
+            </p:extLst>
+          </p:nvPr>
+        </p:nvCxnSpPr>
+        <p:spPr>
+          <a:xfrm>
+            <a:off x="4654296" y="2057400"/>
+            <a:ext cx="0" cy="2743200"/>
+          </a:xfrm>
+          <a:prstGeom prst="line">
+            <a:avLst/>
+          </a:prstGeom>
+          <a:ln w="19050">
+            <a:solidFill>
+              <a:schemeClr val="tx1">
+                <a:lumMod val="85000"/>
+                <a:lumOff val="15000"/>
+              </a:schemeClr>
+            </a:solidFill>
+          </a:ln>
+        </p:spPr>
+        <p:style>
+          <a:lnRef idx="1">
+            <a:schemeClr val="accent1"/>
+          </a:lnRef>
+          <a:fillRef idx="0">
+            <a:schemeClr val="accent1"/>
+          </a:fillRef>
+          <a:effectRef idx="0">
+            <a:schemeClr val="accent1"/>
+          </a:effectRef>
+          <a:fontRef idx="minor">
+            <a:schemeClr val="tx1"/>
+          </a:fontRef>
+        </p:style>
+      </p:cxnSp>
+      <p:sp>
+        <p:nvSpPr>
+          <p:cNvPr id="6" name="CuadroTexto 5">
+            <a:extLst>
+              <a:ext uri="{FF2B5EF4-FFF2-40B4-BE49-F238E27FC236}">
+                <a16:creationId xmlns:a16="http://schemas.microsoft.com/office/drawing/2014/main" id="{768F9F73-7BF4-45E3-AFEB-51E4CDB511F2}"/>
+              </a:ext>
+            </a:extLst>
+          </p:cNvPr>
+          <p:cNvSpPr txBox="1"/>
+          <p:nvPr/>
+        </p:nvSpPr>
+        <p:spPr>
+          <a:xfrm>
+            <a:off x="4976031" y="963877"/>
+            <a:ext cx="6377769" cy="4930246"/>
+          </a:xfrm>
+          <a:prstGeom prst="rect">
+            <a:avLst/>
+          </a:prstGeom>
+        </p:spPr>
+        <p:txBody>
+          <a:bodyPr vert="horz" lIns="91440" tIns="45720" rIns="91440" bIns="45720" rtlCol="0" anchor="ctr">
+            <a:normAutofit/>
+          </a:bodyPr>
+          <a:lstStyle/>
+          <a:p>
+            <a:pPr marL="571500" indent="-228600">
+              <a:lnSpc>
+                <a:spcPct val="90000"/>
+              </a:lnSpc>
+              <a:spcAft>
+                <a:spcPts val="600"/>
+              </a:spcAft>
+              <a:buFont typeface="Arial" panose="020B0604020202020204" pitchFamily="34" charset="0"/>
+              <a:buChar char="•"/>
+            </a:pPr>
+            <a:r>
+              <a:rPr lang="en-US" sz="2400"/>
+              <a:t>Hashes</a:t>
+            </a:r>
+          </a:p>
+          <a:p>
+            <a:pPr marL="571500" indent="-228600">
+              <a:lnSpc>
+                <a:spcPct val="90000"/>
+              </a:lnSpc>
+              <a:spcAft>
+                <a:spcPts val="600"/>
+              </a:spcAft>
+              <a:buFont typeface="Arial" panose="020B0604020202020204" pitchFamily="34" charset="0"/>
+              <a:buChar char="•"/>
+            </a:pPr>
+            <a:r>
+              <a:rPr lang="en-US" sz="2400"/>
+              <a:t>Listas</a:t>
+            </a:r>
+          </a:p>
+          <a:p>
+            <a:pPr marL="571500" indent="-228600">
+              <a:lnSpc>
+                <a:spcPct val="90000"/>
+              </a:lnSpc>
+              <a:spcAft>
+                <a:spcPts val="600"/>
+              </a:spcAft>
+              <a:buFont typeface="Arial" panose="020B0604020202020204" pitchFamily="34" charset="0"/>
+              <a:buChar char="•"/>
+            </a:pPr>
+            <a:r>
+              <a:rPr lang="en-US" sz="2400"/>
+              <a:t>Conjuntos</a:t>
+            </a:r>
+          </a:p>
+          <a:p>
+            <a:pPr marL="571500" indent="-228600">
+              <a:lnSpc>
+                <a:spcPct val="90000"/>
+              </a:lnSpc>
+              <a:spcAft>
+                <a:spcPts val="600"/>
+              </a:spcAft>
+              <a:buFont typeface="Arial" panose="020B0604020202020204" pitchFamily="34" charset="0"/>
+              <a:buChar char="•"/>
+            </a:pPr>
+            <a:r>
+              <a:rPr lang="en-US" sz="2400"/>
+              <a:t>Conjuntos Ordenados</a:t>
+            </a:r>
+          </a:p>
+          <a:p>
+            <a:pPr marL="571500" indent="-228600">
+              <a:lnSpc>
+                <a:spcPct val="90000"/>
+              </a:lnSpc>
+              <a:spcAft>
+                <a:spcPts val="600"/>
+              </a:spcAft>
+              <a:buFont typeface="Arial" panose="020B0604020202020204" pitchFamily="34" charset="0"/>
+              <a:buChar char="•"/>
+            </a:pPr>
+            <a:r>
+              <a:rPr lang="en-US" sz="2400"/>
+              <a:t>Mapa de bits</a:t>
+            </a:r>
+          </a:p>
+          <a:p>
+            <a:pPr marL="571500" indent="-228600">
+              <a:lnSpc>
+                <a:spcPct val="90000"/>
+              </a:lnSpc>
+              <a:spcAft>
+                <a:spcPts val="600"/>
+              </a:spcAft>
+              <a:buFont typeface="Arial" panose="020B0604020202020204" pitchFamily="34" charset="0"/>
+              <a:buChar char="•"/>
+            </a:pPr>
+            <a:r>
+              <a:rPr lang="en-US" sz="2400"/>
+              <a:t>Indices geoespaciales</a:t>
+            </a:r>
+          </a:p>
+        </p:txBody>
+      </p:sp>
+    </p:spTree>
+    <p:extLst>
+      <p:ext uri="{BB962C8B-B14F-4D97-AF65-F5344CB8AC3E}">
+        <p14:creationId xmlns:p14="http://schemas.microsoft.com/office/powerpoint/2010/main" val="1617953913"/>
+      </p:ext>
+    </p:extLst>
+  </p:cSld>
+  <p:clrMapOvr>
+    <a:masterClrMapping/>
+  </p:clrMapOvr>
+</p:sld>
+</file>
+
+<file path=ppt/slides/slide33.xml><?xml version="1.0" encoding="utf-8"?>
+<p:sld xmlns:a="http://schemas.openxmlformats.org/drawingml/2006/main" xmlns:r="http://schemas.openxmlformats.org/officeDocument/2006/relationships" xmlns:p="http://schemas.openxmlformats.org/presentationml/2006/main">
+  <p:cSld>
+    <p:bg>
+      <p:bgPr>
+        <a:solidFill>
+          <a:schemeClr val="bg1"/>
+        </a:solidFill>
+        <a:effectLst/>
+      </p:bgPr>
+    </p:bg>
+    <p:spTree>
+      <p:nvGrpSpPr>
+        <p:cNvPr id="1" name=""/>
+        <p:cNvGrpSpPr/>
+        <p:nvPr/>
+      </p:nvGrpSpPr>
+      <p:grpSpPr>
+        <a:xfrm>
+          <a:off x="0" y="0"/>
+          <a:ext cx="0" cy="0"/>
+          <a:chOff x="0" y="0"/>
+          <a:chExt cx="0" cy="0"/>
+        </a:xfrm>
+      </p:grpSpPr>
+      <p:sp>
+        <p:nvSpPr>
+          <p:cNvPr id="9" name="Rectangle 8">
+            <a:extLst>
+              <a:ext uri="{FF2B5EF4-FFF2-40B4-BE49-F238E27FC236}">
+                <a16:creationId xmlns:a16="http://schemas.microsoft.com/office/drawing/2014/main" id="{A4AC5506-6312-4701-8D3C-40187889A947}"/>
+              </a:ext>
+              <a:ext uri="{C183D7F6-B498-43B3-948B-1728B52AA6E4}">
+                <adec:decorative xmlns:adec="http://schemas.microsoft.com/office/drawing/2017/decorative" val="1"/>
+              </a:ext>
+            </a:extLst>
+          </p:cNvPr>
+          <p:cNvSpPr>
+            <a:spLocks noGrp="1" noRot="1" noChangeAspect="1" noMove="1" noResize="1" noEditPoints="1" noAdjustHandles="1" noChangeArrowheads="1" noChangeShapeType="1" noTextEdit="1"/>
+          </p:cNvSpPr>
+          <p:nvPr>
+            <p:extLst>
+              <p:ext uri="{386F3935-93C4-4BCD-93E2-E3B085C9AB24}">
+                <p16:designElem xmlns:p16="http://schemas.microsoft.com/office/powerpoint/2015/main" val="1"/>
+              </p:ext>
+            </p:extLst>
+          </p:nvPr>
+        </p:nvSpPr>
+        <p:spPr>
+          <a:xfrm>
+            <a:off x="0" y="651752"/>
+            <a:ext cx="12192000" cy="736551"/>
+          </a:xfrm>
+          <a:prstGeom prst="rect">
+            <a:avLst/>
+          </a:prstGeom>
+          <a:solidFill>
+            <a:schemeClr val="tx1"/>
+          </a:solidFill>
+          <a:ln>
+            <a:noFill/>
+          </a:ln>
+        </p:spPr>
+        <p:style>
+          <a:lnRef idx="2">
+            <a:schemeClr val="accent1">
+              <a:shade val="50000"/>
+            </a:schemeClr>
+          </a:lnRef>
+          <a:fillRef idx="1">
+            <a:schemeClr val="accent1"/>
+          </a:fillRef>
+          <a:effectRef idx="0">
+            <a:schemeClr val="accent1"/>
+          </a:effectRef>
+          <a:fontRef idx="minor">
+            <a:schemeClr val="lt1"/>
+          </a:fontRef>
+        </p:style>
+        <p:txBody>
+          <a:bodyPr rtlCol="0" anchor="ctr"/>
+          <a:lstStyle/>
+          <a:p>
+            <a:pPr algn="ctr"/>
+            <a:endParaRPr lang="en-US"/>
+          </a:p>
+        </p:txBody>
+      </p:sp>
+      <p:sp>
+        <p:nvSpPr>
+          <p:cNvPr id="2" name="CuadroTexto 1">
+            <a:extLst>
+              <a:ext uri="{FF2B5EF4-FFF2-40B4-BE49-F238E27FC236}">
+                <a16:creationId xmlns:a16="http://schemas.microsoft.com/office/drawing/2014/main" id="{A7F3F451-89EE-48EF-AB36-D9F6082585A1}"/>
+              </a:ext>
+            </a:extLst>
+          </p:cNvPr>
+          <p:cNvSpPr txBox="1"/>
+          <p:nvPr/>
+        </p:nvSpPr>
+        <p:spPr>
+          <a:xfrm>
+            <a:off x="556532" y="643467"/>
+            <a:ext cx="11210925" cy="744836"/>
+          </a:xfrm>
+          <a:prstGeom prst="rect">
+            <a:avLst/>
+          </a:prstGeom>
+        </p:spPr>
+        <p:txBody>
+          <a:bodyPr vert="horz" lIns="91440" tIns="45720" rIns="91440" bIns="45720" rtlCol="0" anchor="ctr">
+            <a:normAutofit/>
+          </a:bodyPr>
+          <a:lstStyle/>
+          <a:p>
+            <a:pPr algn="ctr">
+              <a:lnSpc>
+                <a:spcPct val="90000"/>
+              </a:lnSpc>
+              <a:spcBef>
+                <a:spcPct val="0"/>
+              </a:spcBef>
+              <a:spcAft>
+                <a:spcPts val="600"/>
+              </a:spcAft>
+            </a:pPr>
+            <a:r>
+              <a:rPr lang="en-US" sz="3200" kern="1200" dirty="0" err="1">
+                <a:solidFill>
+                  <a:schemeClr val="bg1"/>
+                </a:solidFill>
+                <a:latin typeface="+mj-lt"/>
+                <a:ea typeface="+mj-ea"/>
+                <a:cs typeface="+mj-cs"/>
+              </a:rPr>
+              <a:t>Redis</a:t>
+            </a:r>
+            <a:r>
+              <a:rPr lang="en-US" sz="3200" kern="1200" dirty="0">
+                <a:solidFill>
+                  <a:schemeClr val="bg1"/>
+                </a:solidFill>
+                <a:latin typeface="+mj-lt"/>
+                <a:ea typeface="+mj-ea"/>
+                <a:cs typeface="+mj-cs"/>
+              </a:rPr>
+              <a:t> cache</a:t>
+            </a:r>
+          </a:p>
+        </p:txBody>
+      </p:sp>
+      <p:pic>
+        <p:nvPicPr>
+          <p:cNvPr id="4" name="Imagen 3" descr="Imagen que contiene captura de pantalla&#10;&#10;Descripción generada con confianza muy alta">
+            <a:extLst>
+              <a:ext uri="{FF2B5EF4-FFF2-40B4-BE49-F238E27FC236}">
+                <a16:creationId xmlns:a16="http://schemas.microsoft.com/office/drawing/2014/main" id="{B17E9DE8-4A45-43CA-9946-E2CEB4C4A5E2}"/>
+              </a:ext>
+            </a:extLst>
+          </p:cNvPr>
+          <p:cNvPicPr>
+            <a:picLocks noChangeAspect="1"/>
+          </p:cNvPicPr>
+          <p:nvPr/>
+        </p:nvPicPr>
+        <p:blipFill>
+          <a:blip r:embed="rId3"/>
+          <a:stretch>
+            <a:fillRect/>
+          </a:stretch>
+        </p:blipFill>
+        <p:spPr>
+          <a:xfrm>
+            <a:off x="3242623" y="1675227"/>
+            <a:ext cx="5706753" cy="4394199"/>
+          </a:xfrm>
+          <a:prstGeom prst="rect">
+            <a:avLst/>
+          </a:prstGeom>
+        </p:spPr>
+      </p:pic>
+    </p:spTree>
+    <p:extLst>
+      <p:ext uri="{BB962C8B-B14F-4D97-AF65-F5344CB8AC3E}">
+        <p14:creationId xmlns:p14="http://schemas.microsoft.com/office/powerpoint/2010/main" val="2558160505"/>
+      </p:ext>
+    </p:extLst>
+  </p:cSld>
+  <p:clrMapOvr>
+    <a:masterClrMapping/>
+  </p:clrMapOvr>
+</p:sld>
+</file>
+
+<file path=ppt/slides/slide34.xml><?xml version="1.0" encoding="utf-8"?>
+<p:sld xmlns:a="http://schemas.openxmlformats.org/drawingml/2006/main" xmlns:r="http://schemas.openxmlformats.org/officeDocument/2006/relationships" xmlns:p="http://schemas.openxmlformats.org/presentationml/2006/main">
+  <p:cSld>
+    <p:bg>
+      <p:bgPr>
+        <a:solidFill>
+          <a:schemeClr val="bg1"/>
+        </a:solidFill>
+        <a:effectLst/>
+      </p:bgPr>
+    </p:bg>
+    <p:spTree>
+      <p:nvGrpSpPr>
+        <p:cNvPr id="1" name=""/>
+        <p:cNvGrpSpPr/>
+        <p:nvPr/>
+      </p:nvGrpSpPr>
+      <p:grpSpPr>
+        <a:xfrm>
+          <a:off x="0" y="0"/>
+          <a:ext cx="0" cy="0"/>
+          <a:chOff x="0" y="0"/>
+          <a:chExt cx="0" cy="0"/>
+        </a:xfrm>
+      </p:grpSpPr>
+      <p:sp>
+        <p:nvSpPr>
+          <p:cNvPr id="14" name="Rectangle 13">
+            <a:extLst>
+              <a:ext uri="{FF2B5EF4-FFF2-40B4-BE49-F238E27FC236}">
+                <a16:creationId xmlns:a16="http://schemas.microsoft.com/office/drawing/2014/main" id="{A4AC5506-6312-4701-8D3C-40187889A947}"/>
+              </a:ext>
+              <a:ext uri="{C183D7F6-B498-43B3-948B-1728B52AA6E4}">
+                <adec:decorative xmlns:adec="http://schemas.microsoft.com/office/drawing/2017/decorative" val="1"/>
+              </a:ext>
+            </a:extLst>
+          </p:cNvPr>
+          <p:cNvSpPr>
+            <a:spLocks noGrp="1" noRot="1" noChangeAspect="1" noMove="1" noResize="1" noEditPoints="1" noAdjustHandles="1" noChangeArrowheads="1" noChangeShapeType="1" noTextEdit="1"/>
+          </p:cNvSpPr>
+          <p:nvPr>
+            <p:extLst>
+              <p:ext uri="{386F3935-93C4-4BCD-93E2-E3B085C9AB24}">
+                <p16:designElem xmlns:p16="http://schemas.microsoft.com/office/powerpoint/2015/main" val="1"/>
+              </p:ext>
+            </p:extLst>
+          </p:nvPr>
+        </p:nvSpPr>
+        <p:spPr>
+          <a:xfrm>
+            <a:off x="0" y="651752"/>
+            <a:ext cx="12192000" cy="736551"/>
+          </a:xfrm>
+          <a:prstGeom prst="rect">
+            <a:avLst/>
+          </a:prstGeom>
+          <a:solidFill>
+            <a:schemeClr val="tx1"/>
+          </a:solidFill>
+          <a:ln>
+            <a:noFill/>
+          </a:ln>
+        </p:spPr>
+        <p:style>
+          <a:lnRef idx="2">
+            <a:schemeClr val="accent1">
+              <a:shade val="50000"/>
+            </a:schemeClr>
+          </a:lnRef>
+          <a:fillRef idx="1">
+            <a:schemeClr val="accent1"/>
+          </a:fillRef>
+          <a:effectRef idx="0">
+            <a:schemeClr val="accent1"/>
+          </a:effectRef>
+          <a:fontRef idx="minor">
+            <a:schemeClr val="lt1"/>
+          </a:fontRef>
+        </p:style>
+        <p:txBody>
+          <a:bodyPr rtlCol="0" anchor="ctr"/>
+          <a:lstStyle/>
+          <a:p>
+            <a:pPr algn="ctr"/>
+            <a:endParaRPr lang="en-US"/>
+          </a:p>
+        </p:txBody>
+      </p:sp>
+      <p:sp>
+        <p:nvSpPr>
+          <p:cNvPr id="2" name="CuadroTexto 1">
+            <a:extLst>
+              <a:ext uri="{FF2B5EF4-FFF2-40B4-BE49-F238E27FC236}">
+                <a16:creationId xmlns:a16="http://schemas.microsoft.com/office/drawing/2014/main" id="{A7F3F451-89EE-48EF-AB36-D9F6082585A1}"/>
+              </a:ext>
+            </a:extLst>
+          </p:cNvPr>
+          <p:cNvSpPr txBox="1"/>
+          <p:nvPr/>
+        </p:nvSpPr>
+        <p:spPr>
+          <a:xfrm>
+            <a:off x="556532" y="643467"/>
+            <a:ext cx="11210925" cy="744836"/>
+          </a:xfrm>
+          <a:prstGeom prst="rect">
+            <a:avLst/>
+          </a:prstGeom>
+        </p:spPr>
+        <p:txBody>
+          <a:bodyPr vert="horz" lIns="91440" tIns="45720" rIns="91440" bIns="45720" rtlCol="0" anchor="ctr">
+            <a:normAutofit/>
+          </a:bodyPr>
+          <a:lstStyle/>
+          <a:p>
+            <a:pPr algn="ctr">
+              <a:lnSpc>
+                <a:spcPct val="90000"/>
+              </a:lnSpc>
+              <a:spcBef>
+                <a:spcPct val="0"/>
+              </a:spcBef>
+              <a:spcAft>
+                <a:spcPts val="600"/>
+              </a:spcAft>
+            </a:pPr>
+            <a:r>
+              <a:rPr lang="en-US" sz="3200" kern="1200" dirty="0" err="1">
+                <a:solidFill>
+                  <a:schemeClr val="bg1"/>
+                </a:solidFill>
+                <a:latin typeface="+mj-lt"/>
+                <a:ea typeface="+mj-ea"/>
+                <a:cs typeface="+mj-cs"/>
+              </a:rPr>
+              <a:t>Redis</a:t>
+            </a:r>
+            <a:r>
+              <a:rPr lang="en-US" sz="3200" kern="1200" dirty="0">
+                <a:solidFill>
+                  <a:schemeClr val="bg1"/>
+                </a:solidFill>
+                <a:latin typeface="+mj-lt"/>
+                <a:ea typeface="+mj-ea"/>
+                <a:cs typeface="+mj-cs"/>
+              </a:rPr>
+              <a:t> Web</a:t>
+            </a:r>
+          </a:p>
+        </p:txBody>
+      </p:sp>
+      <p:pic>
+        <p:nvPicPr>
+          <p:cNvPr id="3" name="Imagen 2" descr="Imagen que contiene texto&#10;&#10;Descripción generada con confianza muy alta">
+            <a:extLst>
+              <a:ext uri="{FF2B5EF4-FFF2-40B4-BE49-F238E27FC236}">
+                <a16:creationId xmlns:a16="http://schemas.microsoft.com/office/drawing/2014/main" id="{F78FDDBB-0F95-4F36-986F-62723A071DA3}"/>
+              </a:ext>
+            </a:extLst>
+          </p:cNvPr>
+          <p:cNvPicPr>
+            <a:picLocks noChangeAspect="1"/>
+          </p:cNvPicPr>
+          <p:nvPr/>
+        </p:nvPicPr>
+        <p:blipFill>
+          <a:blip r:embed="rId3"/>
+          <a:stretch>
+            <a:fillRect/>
+          </a:stretch>
+        </p:blipFill>
+        <p:spPr>
+          <a:xfrm>
+            <a:off x="2207327" y="1675227"/>
+            <a:ext cx="7777345" cy="4394199"/>
+          </a:xfrm>
+          <a:prstGeom prst="rect">
+            <a:avLst/>
+          </a:prstGeom>
+        </p:spPr>
+      </p:pic>
+    </p:spTree>
+    <p:extLst>
+      <p:ext uri="{BB962C8B-B14F-4D97-AF65-F5344CB8AC3E}">
+        <p14:creationId xmlns:p14="http://schemas.microsoft.com/office/powerpoint/2010/main" val="2949193075"/>
+      </p:ext>
+    </p:extLst>
+  </p:cSld>
+  <p:clrMapOvr>
+    <a:masterClrMapping/>
+  </p:clrMapOvr>
+</p:sld>
+</file>
+
+<file path=ppt/slides/slide35.xml><?xml version="1.0" encoding="utf-8"?>
+<p:sld xmlns:a="http://schemas.openxmlformats.org/drawingml/2006/main" xmlns:r="http://schemas.openxmlformats.org/officeDocument/2006/relationships" xmlns:p="http://schemas.openxmlformats.org/presentationml/2006/main">
+  <p:cSld>
+    <p:bg>
+      <p:bgPr>
+        <a:solidFill>
+          <a:schemeClr val="bg1"/>
+        </a:solidFill>
+        <a:effectLst/>
+      </p:bgPr>
+    </p:bg>
+    <p:spTree>
+      <p:nvGrpSpPr>
+        <p:cNvPr id="1" name=""/>
+        <p:cNvGrpSpPr/>
+        <p:nvPr/>
+      </p:nvGrpSpPr>
+      <p:grpSpPr>
+        <a:xfrm>
+          <a:off x="0" y="0"/>
+          <a:ext cx="0" cy="0"/>
+          <a:chOff x="0" y="0"/>
+          <a:chExt cx="0" cy="0"/>
+        </a:xfrm>
+      </p:grpSpPr>
+      <p:sp>
+        <p:nvSpPr>
+          <p:cNvPr id="14" name="Rectangle 13">
+            <a:extLst>
+              <a:ext uri="{FF2B5EF4-FFF2-40B4-BE49-F238E27FC236}">
+                <a16:creationId xmlns:a16="http://schemas.microsoft.com/office/drawing/2014/main" id="{A4AC5506-6312-4701-8D3C-40187889A947}"/>
+              </a:ext>
+              <a:ext uri="{C183D7F6-B498-43B3-948B-1728B52AA6E4}">
+                <adec:decorative xmlns:adec="http://schemas.microsoft.com/office/drawing/2017/decorative" val="1"/>
+              </a:ext>
+            </a:extLst>
+          </p:cNvPr>
+          <p:cNvSpPr>
+            <a:spLocks noGrp="1" noRot="1" noChangeAspect="1" noMove="1" noResize="1" noEditPoints="1" noAdjustHandles="1" noChangeArrowheads="1" noChangeShapeType="1" noTextEdit="1"/>
+          </p:cNvSpPr>
+          <p:nvPr>
+            <p:extLst>
+              <p:ext uri="{386F3935-93C4-4BCD-93E2-E3B085C9AB24}">
+                <p16:designElem xmlns:p16="http://schemas.microsoft.com/office/powerpoint/2015/main" val="1"/>
+              </p:ext>
+            </p:extLst>
+          </p:nvPr>
+        </p:nvSpPr>
+        <p:spPr>
+          <a:xfrm>
+            <a:off x="0" y="651752"/>
+            <a:ext cx="12192000" cy="736551"/>
+          </a:xfrm>
+          <a:prstGeom prst="rect">
+            <a:avLst/>
+          </a:prstGeom>
+          <a:solidFill>
+            <a:schemeClr val="tx1"/>
+          </a:solidFill>
+          <a:ln>
+            <a:noFill/>
+          </a:ln>
+        </p:spPr>
+        <p:style>
+          <a:lnRef idx="2">
+            <a:schemeClr val="accent1">
+              <a:shade val="50000"/>
+            </a:schemeClr>
+          </a:lnRef>
+          <a:fillRef idx="1">
+            <a:schemeClr val="accent1"/>
+          </a:fillRef>
+          <a:effectRef idx="0">
+            <a:schemeClr val="accent1"/>
+          </a:effectRef>
+          <a:fontRef idx="minor">
+            <a:schemeClr val="lt1"/>
+          </a:fontRef>
+        </p:style>
+        <p:txBody>
+          <a:bodyPr rtlCol="0" anchor="ctr"/>
+          <a:lstStyle/>
+          <a:p>
+            <a:pPr algn="ctr"/>
+            <a:endParaRPr lang="en-US"/>
+          </a:p>
+        </p:txBody>
+      </p:sp>
+      <p:sp>
+        <p:nvSpPr>
+          <p:cNvPr id="2" name="CuadroTexto 1">
+            <a:extLst>
+              <a:ext uri="{FF2B5EF4-FFF2-40B4-BE49-F238E27FC236}">
+                <a16:creationId xmlns:a16="http://schemas.microsoft.com/office/drawing/2014/main" id="{A7F3F451-89EE-48EF-AB36-D9F6082585A1}"/>
+              </a:ext>
+            </a:extLst>
+          </p:cNvPr>
+          <p:cNvSpPr txBox="1"/>
+          <p:nvPr/>
+        </p:nvSpPr>
+        <p:spPr>
+          <a:xfrm>
+            <a:off x="556532" y="643467"/>
+            <a:ext cx="11210925" cy="744836"/>
+          </a:xfrm>
+          <a:prstGeom prst="rect">
+            <a:avLst/>
+          </a:prstGeom>
+        </p:spPr>
+        <p:txBody>
+          <a:bodyPr vert="horz" lIns="91440" tIns="45720" rIns="91440" bIns="45720" rtlCol="0" anchor="ctr">
+            <a:normAutofit/>
+          </a:bodyPr>
+          <a:lstStyle/>
+          <a:p>
+            <a:pPr algn="ctr">
+              <a:lnSpc>
+                <a:spcPct val="90000"/>
+              </a:lnSpc>
+              <a:spcBef>
+                <a:spcPct val="0"/>
+              </a:spcBef>
+              <a:spcAft>
+                <a:spcPts val="600"/>
+              </a:spcAft>
+            </a:pPr>
+            <a:r>
+              <a:rPr lang="en-US" sz="3200" kern="1200" dirty="0" err="1">
+                <a:solidFill>
+                  <a:schemeClr val="bg1"/>
+                </a:solidFill>
+                <a:latin typeface="+mj-lt"/>
+                <a:ea typeface="+mj-ea"/>
+                <a:cs typeface="+mj-cs"/>
+              </a:rPr>
+              <a:t>Redis</a:t>
+            </a:r>
+            <a:r>
+              <a:rPr lang="en-US" sz="3200" kern="1200" dirty="0">
+                <a:solidFill>
+                  <a:schemeClr val="bg1"/>
+                </a:solidFill>
+                <a:latin typeface="+mj-lt"/>
+                <a:ea typeface="+mj-ea"/>
+                <a:cs typeface="+mj-cs"/>
+              </a:rPr>
+              <a:t> MQ</a:t>
+            </a:r>
+          </a:p>
+        </p:txBody>
+      </p:sp>
+      <p:pic>
+        <p:nvPicPr>
+          <p:cNvPr id="4" name="Imagen 3">
+            <a:extLst>
+              <a:ext uri="{FF2B5EF4-FFF2-40B4-BE49-F238E27FC236}">
+                <a16:creationId xmlns:a16="http://schemas.microsoft.com/office/drawing/2014/main" id="{A81C4BA4-312E-4808-A49B-E81728D18D35}"/>
+              </a:ext>
+            </a:extLst>
+          </p:cNvPr>
+          <p:cNvPicPr>
+            <a:picLocks noChangeAspect="1"/>
+          </p:cNvPicPr>
+          <p:nvPr/>
+        </p:nvPicPr>
+        <p:blipFill>
+          <a:blip r:embed="rId3"/>
+          <a:stretch>
+            <a:fillRect/>
+          </a:stretch>
+        </p:blipFill>
+        <p:spPr>
+          <a:xfrm>
+            <a:off x="2867025" y="1895475"/>
+            <a:ext cx="6457950" cy="3752850"/>
+          </a:xfrm>
+          <a:prstGeom prst="rect">
+            <a:avLst/>
+          </a:prstGeom>
+        </p:spPr>
+      </p:pic>
+    </p:spTree>
+    <p:extLst>
+      <p:ext uri="{BB962C8B-B14F-4D97-AF65-F5344CB8AC3E}">
+        <p14:creationId xmlns:p14="http://schemas.microsoft.com/office/powerpoint/2010/main" val="4050902088"/>
       </p:ext>
     </p:extLst>
   </p:cSld>

</xml_diff>